<commit_message>
Updating documentation & Deliverables
</commit_message>
<xml_diff>
--- a/Project_5_Deliverables/Presentation_projet_5.pptx
+++ b/Project_5_Deliverables/Presentation_projet_5.pptx
@@ -107,6 +107,11 @@
       </a:defRPr>
     </a:lvl9pPr>
   </p:defaultTextStyle>
+  <p:extLst>
+    <p:ext uri="{EFAFB233-063F-42B5-8137-9DF3F51BA10A}">
+      <p15:sldGuideLst xmlns:p15="http://schemas.microsoft.com/office/powerpoint/2012/main"/>
+    </p:ext>
+  </p:extLst>
 </p:presentation>
 </file>
 
@@ -241,7 +246,7 @@
           <a:p>
             <a:fld id="{62C18B61-6AE0-8744-9942-041E72F23691}" type="datetimeFigureOut">
               <a:rPr lang="fr-FR" smtClean="0"/>
-              <a:t>02/04/2020</a:t>
+              <a:t>14/04/2020</a:t>
             </a:fld>
             <a:endParaRPr lang="fr-FR"/>
           </a:p>
@@ -411,7 +416,7 @@
           <a:p>
             <a:fld id="{62C18B61-6AE0-8744-9942-041E72F23691}" type="datetimeFigureOut">
               <a:rPr lang="fr-FR" smtClean="0"/>
-              <a:t>02/04/2020</a:t>
+              <a:t>14/04/2020</a:t>
             </a:fld>
             <a:endParaRPr lang="fr-FR"/>
           </a:p>
@@ -591,7 +596,7 @@
           <a:p>
             <a:fld id="{62C18B61-6AE0-8744-9942-041E72F23691}" type="datetimeFigureOut">
               <a:rPr lang="fr-FR" smtClean="0"/>
-              <a:t>02/04/2020</a:t>
+              <a:t>14/04/2020</a:t>
             </a:fld>
             <a:endParaRPr lang="fr-FR"/>
           </a:p>
@@ -741,7 +746,7 @@
             <a:fld id="{7A8F43F0-37D7-0E4C-B57F-F44AD88BCCF8}" type="datetime1">
               <a:rPr lang="fr-FR" smtClean="0"/>
               <a:pPr/>
-              <a:t>02/04/2020</a:t>
+              <a:t>14/04/2020</a:t>
             </a:fld>
             <a:endParaRPr lang="fr-FR"/>
           </a:p>
@@ -931,7 +936,7 @@
           <a:p>
             <a:fld id="{62C18B61-6AE0-8744-9942-041E72F23691}" type="datetimeFigureOut">
               <a:rPr lang="fr-FR" smtClean="0"/>
-              <a:t>02/04/2020</a:t>
+              <a:t>14/04/2020</a:t>
             </a:fld>
             <a:endParaRPr lang="fr-FR"/>
           </a:p>
@@ -1175,7 +1180,7 @@
           <a:p>
             <a:fld id="{62C18B61-6AE0-8744-9942-041E72F23691}" type="datetimeFigureOut">
               <a:rPr lang="fr-FR" smtClean="0"/>
-              <a:t>02/04/2020</a:t>
+              <a:t>14/04/2020</a:t>
             </a:fld>
             <a:endParaRPr lang="fr-FR"/>
           </a:p>
@@ -1407,7 +1412,7 @@
           <a:p>
             <a:fld id="{62C18B61-6AE0-8744-9942-041E72F23691}" type="datetimeFigureOut">
               <a:rPr lang="fr-FR" smtClean="0"/>
-              <a:t>02/04/2020</a:t>
+              <a:t>14/04/2020</a:t>
             </a:fld>
             <a:endParaRPr lang="fr-FR"/>
           </a:p>
@@ -1774,7 +1779,7 @@
           <a:p>
             <a:fld id="{62C18B61-6AE0-8744-9942-041E72F23691}" type="datetimeFigureOut">
               <a:rPr lang="fr-FR" smtClean="0"/>
-              <a:t>02/04/2020</a:t>
+              <a:t>14/04/2020</a:t>
             </a:fld>
             <a:endParaRPr lang="fr-FR"/>
           </a:p>
@@ -1892,7 +1897,7 @@
           <a:p>
             <a:fld id="{62C18B61-6AE0-8744-9942-041E72F23691}" type="datetimeFigureOut">
               <a:rPr lang="fr-FR" smtClean="0"/>
-              <a:t>02/04/2020</a:t>
+              <a:t>14/04/2020</a:t>
             </a:fld>
             <a:endParaRPr lang="fr-FR"/>
           </a:p>
@@ -1987,7 +1992,7 @@
           <a:p>
             <a:fld id="{62C18B61-6AE0-8744-9942-041E72F23691}" type="datetimeFigureOut">
               <a:rPr lang="fr-FR" smtClean="0"/>
-              <a:t>02/04/2020</a:t>
+              <a:t>14/04/2020</a:t>
             </a:fld>
             <a:endParaRPr lang="fr-FR"/>
           </a:p>
@@ -2264,7 +2269,7 @@
           <a:p>
             <a:fld id="{62C18B61-6AE0-8744-9942-041E72F23691}" type="datetimeFigureOut">
               <a:rPr lang="fr-FR" smtClean="0"/>
-              <a:t>02/04/2020</a:t>
+              <a:t>14/04/2020</a:t>
             </a:fld>
             <a:endParaRPr lang="fr-FR"/>
           </a:p>
@@ -2521,7 +2526,7 @@
           <a:p>
             <a:fld id="{62C18B61-6AE0-8744-9942-041E72F23691}" type="datetimeFigureOut">
               <a:rPr lang="fr-FR" smtClean="0"/>
-              <a:t>02/04/2020</a:t>
+              <a:t>14/04/2020</a:t>
             </a:fld>
             <a:endParaRPr lang="fr-FR"/>
           </a:p>
@@ -2734,7 +2739,7 @@
           <a:p>
             <a:fld id="{62C18B61-6AE0-8744-9942-041E72F23691}" type="datetimeFigureOut">
               <a:rPr lang="fr-FR" smtClean="0"/>
-              <a:t>02/04/2020</a:t>
+              <a:t>14/04/2020</a:t>
             </a:fld>
             <a:endParaRPr lang="fr-FR"/>
           </a:p>
@@ -3163,7 +3168,7 @@
           <a:p>
             <a:fld id="{0136EE4A-550F-334C-9212-6C4E51CC2283}" type="datetime1">
               <a:rPr lang="fr-FR" smtClean="0"/>
-              <a:t>02/04/2020</a:t>
+              <a:t>14/04/2020</a:t>
             </a:fld>
             <a:endParaRPr lang="fr-FR"/>
           </a:p>
@@ -3836,7 +3841,7 @@
           <a:p>
             <a:fld id="{0136EE4A-550F-334C-9212-6C4E51CC2283}" type="datetime1">
               <a:rPr lang="fr-FR" smtClean="0"/>
-              <a:t>02/04/2020</a:t>
+              <a:t>14/04/2020</a:t>
             </a:fld>
             <a:endParaRPr lang="fr-FR"/>
           </a:p>
@@ -4947,7 +4952,7 @@
           <a:p>
             <a:fld id="{0136EE4A-550F-334C-9212-6C4E51CC2283}" type="datetime1">
               <a:rPr lang="fr-FR" smtClean="0"/>
-              <a:t>02/04/2020</a:t>
+              <a:t>14/04/2020</a:t>
             </a:fld>
             <a:endParaRPr lang="fr-FR"/>
           </a:p>
@@ -5418,10 +5423,10 @@
       </p:sp>
       <p:pic>
         <p:nvPicPr>
-          <p:cNvPr id="3" name="Image 2" descr="Une image contenant texte, carte&#10;&#10;Description générée automatiquement">
+          <p:cNvPr id="8" name="Image 7" descr="Une image contenant texte, carte&#10;&#10;Description générée automatiquement">
             <a:extLst>
               <a:ext uri="{FF2B5EF4-FFF2-40B4-BE49-F238E27FC236}">
-                <a16:creationId xmlns:a16="http://schemas.microsoft.com/office/drawing/2014/main" id="{79159C63-8B01-7145-BC2A-0BBE2BE7F2DA}"/>
+                <a16:creationId xmlns:a16="http://schemas.microsoft.com/office/drawing/2014/main" id="{AA206268-96CD-6C48-AB08-5CFF896CB9E9}"/>
               </a:ext>
             </a:extLst>
           </p:cNvPr>
@@ -5438,8 +5443,8 @@
         </p:blipFill>
         <p:spPr>
           <a:xfrm>
-            <a:off x="129209" y="1553057"/>
-            <a:ext cx="8469668" cy="4076439"/>
+            <a:off x="0" y="1228503"/>
+            <a:ext cx="9144000" cy="4400994"/>
           </a:xfrm>
           <a:prstGeom prst="rect">
             <a:avLst/>
@@ -5499,7 +5504,7 @@
           <a:p>
             <a:fld id="{0136EE4A-550F-334C-9212-6C4E51CC2283}" type="datetime1">
               <a:rPr lang="fr-FR" smtClean="0"/>
-              <a:t>02/04/2020</a:t>
+              <a:t>14/04/2020</a:t>
             </a:fld>
             <a:endParaRPr lang="fr-FR"/>
           </a:p>

</xml_diff>

<commit_message>
Project deliverables + cosmetic changes
</commit_message>
<xml_diff>
--- a/Project_5_Deliverables/Presentation_projet_5.pptx
+++ b/Project_5_Deliverables/Presentation_projet_5.pptx
@@ -246,7 +246,7 @@
           <a:p>
             <a:fld id="{62C18B61-6AE0-8744-9942-041E72F23691}" type="datetimeFigureOut">
               <a:rPr lang="fr-FR" smtClean="0"/>
-              <a:t>14/04/2020</a:t>
+              <a:t>16/05/2020</a:t>
             </a:fld>
             <a:endParaRPr lang="fr-FR"/>
           </a:p>
@@ -416,7 +416,7 @@
           <a:p>
             <a:fld id="{62C18B61-6AE0-8744-9942-041E72F23691}" type="datetimeFigureOut">
               <a:rPr lang="fr-FR" smtClean="0"/>
-              <a:t>14/04/2020</a:t>
+              <a:t>16/05/2020</a:t>
             </a:fld>
             <a:endParaRPr lang="fr-FR"/>
           </a:p>
@@ -596,7 +596,7 @@
           <a:p>
             <a:fld id="{62C18B61-6AE0-8744-9942-041E72F23691}" type="datetimeFigureOut">
               <a:rPr lang="fr-FR" smtClean="0"/>
-              <a:t>14/04/2020</a:t>
+              <a:t>16/05/2020</a:t>
             </a:fld>
             <a:endParaRPr lang="fr-FR"/>
           </a:p>
@@ -746,7 +746,7 @@
             <a:fld id="{7A8F43F0-37D7-0E4C-B57F-F44AD88BCCF8}" type="datetime1">
               <a:rPr lang="fr-FR" smtClean="0"/>
               <a:pPr/>
-              <a:t>14/04/2020</a:t>
+              <a:t>16/05/2020</a:t>
             </a:fld>
             <a:endParaRPr lang="fr-FR"/>
           </a:p>
@@ -936,7 +936,7 @@
           <a:p>
             <a:fld id="{62C18B61-6AE0-8744-9942-041E72F23691}" type="datetimeFigureOut">
               <a:rPr lang="fr-FR" smtClean="0"/>
-              <a:t>14/04/2020</a:t>
+              <a:t>16/05/2020</a:t>
             </a:fld>
             <a:endParaRPr lang="fr-FR"/>
           </a:p>
@@ -1180,7 +1180,7 @@
           <a:p>
             <a:fld id="{62C18B61-6AE0-8744-9942-041E72F23691}" type="datetimeFigureOut">
               <a:rPr lang="fr-FR" smtClean="0"/>
-              <a:t>14/04/2020</a:t>
+              <a:t>16/05/2020</a:t>
             </a:fld>
             <a:endParaRPr lang="fr-FR"/>
           </a:p>
@@ -1412,7 +1412,7 @@
           <a:p>
             <a:fld id="{62C18B61-6AE0-8744-9942-041E72F23691}" type="datetimeFigureOut">
               <a:rPr lang="fr-FR" smtClean="0"/>
-              <a:t>14/04/2020</a:t>
+              <a:t>16/05/2020</a:t>
             </a:fld>
             <a:endParaRPr lang="fr-FR"/>
           </a:p>
@@ -1779,7 +1779,7 @@
           <a:p>
             <a:fld id="{62C18B61-6AE0-8744-9942-041E72F23691}" type="datetimeFigureOut">
               <a:rPr lang="fr-FR" smtClean="0"/>
-              <a:t>14/04/2020</a:t>
+              <a:t>16/05/2020</a:t>
             </a:fld>
             <a:endParaRPr lang="fr-FR"/>
           </a:p>
@@ -1897,7 +1897,7 @@
           <a:p>
             <a:fld id="{62C18B61-6AE0-8744-9942-041E72F23691}" type="datetimeFigureOut">
               <a:rPr lang="fr-FR" smtClean="0"/>
-              <a:t>14/04/2020</a:t>
+              <a:t>16/05/2020</a:t>
             </a:fld>
             <a:endParaRPr lang="fr-FR"/>
           </a:p>
@@ -1992,7 +1992,7 @@
           <a:p>
             <a:fld id="{62C18B61-6AE0-8744-9942-041E72F23691}" type="datetimeFigureOut">
               <a:rPr lang="fr-FR" smtClean="0"/>
-              <a:t>14/04/2020</a:t>
+              <a:t>16/05/2020</a:t>
             </a:fld>
             <a:endParaRPr lang="fr-FR"/>
           </a:p>
@@ -2269,7 +2269,7 @@
           <a:p>
             <a:fld id="{62C18B61-6AE0-8744-9942-041E72F23691}" type="datetimeFigureOut">
               <a:rPr lang="fr-FR" smtClean="0"/>
-              <a:t>14/04/2020</a:t>
+              <a:t>16/05/2020</a:t>
             </a:fld>
             <a:endParaRPr lang="fr-FR"/>
           </a:p>
@@ -2526,7 +2526,7 @@
           <a:p>
             <a:fld id="{62C18B61-6AE0-8744-9942-041E72F23691}" type="datetimeFigureOut">
               <a:rPr lang="fr-FR" smtClean="0"/>
-              <a:t>14/04/2020</a:t>
+              <a:t>16/05/2020</a:t>
             </a:fld>
             <a:endParaRPr lang="fr-FR"/>
           </a:p>
@@ -2739,7 +2739,7 @@
           <a:p>
             <a:fld id="{62C18B61-6AE0-8744-9942-041E72F23691}" type="datetimeFigureOut">
               <a:rPr lang="fr-FR" smtClean="0"/>
-              <a:t>14/04/2020</a:t>
+              <a:t>16/05/2020</a:t>
             </a:fld>
             <a:endParaRPr lang="fr-FR"/>
           </a:p>
@@ -3168,7 +3168,7 @@
           <a:p>
             <a:fld id="{0136EE4A-550F-334C-9212-6C4E51CC2283}" type="datetime1">
               <a:rPr lang="fr-FR" smtClean="0"/>
-              <a:t>14/04/2020</a:t>
+              <a:t>16/05/2020</a:t>
             </a:fld>
             <a:endParaRPr lang="fr-FR"/>
           </a:p>
@@ -3841,7 +3841,7 @@
           <a:p>
             <a:fld id="{0136EE4A-550F-334C-9212-6C4E51CC2283}" type="datetime1">
               <a:rPr lang="fr-FR" smtClean="0"/>
-              <a:t>14/04/2020</a:t>
+              <a:t>16/05/2020</a:t>
             </a:fld>
             <a:endParaRPr lang="fr-FR"/>
           </a:p>
@@ -4478,7 +4478,7 @@
         </p:nvSpPr>
         <p:spPr>
           <a:xfrm>
-            <a:off x="852453" y="3689246"/>
+            <a:off x="428307" y="3693358"/>
             <a:ext cx="2840521" cy="1415772"/>
           </a:xfrm>
           <a:custGeom>
@@ -4621,22 +4621,22 @@
         </p:nvSpPr>
         <p:spPr>
           <a:xfrm>
-            <a:off x="5375171" y="3135248"/>
-            <a:ext cx="2916376" cy="2523768"/>
+            <a:off x="5775864" y="3107287"/>
+            <a:ext cx="2916376" cy="3077766"/>
           </a:xfrm>
           <a:custGeom>
             <a:avLst/>
             <a:gdLst>
               <a:gd name="connsiteX0" fmla="*/ 0 w 2916376"/>
-              <a:gd name="connsiteY0" fmla="*/ 0 h 2523768"/>
+              <a:gd name="connsiteY0" fmla="*/ 0 h 3077766"/>
               <a:gd name="connsiteX1" fmla="*/ 2916376 w 2916376"/>
-              <a:gd name="connsiteY1" fmla="*/ 0 h 2523768"/>
+              <a:gd name="connsiteY1" fmla="*/ 0 h 3077766"/>
               <a:gd name="connsiteX2" fmla="*/ 2916376 w 2916376"/>
-              <a:gd name="connsiteY2" fmla="*/ 2523768 h 2523768"/>
+              <a:gd name="connsiteY2" fmla="*/ 3077766 h 3077766"/>
               <a:gd name="connsiteX3" fmla="*/ 0 w 2916376"/>
-              <a:gd name="connsiteY3" fmla="*/ 2523768 h 2523768"/>
+              <a:gd name="connsiteY3" fmla="*/ 3077766 h 3077766"/>
               <a:gd name="connsiteX4" fmla="*/ 0 w 2916376"/>
-              <a:gd name="connsiteY4" fmla="*/ 0 h 2523768"/>
+              <a:gd name="connsiteY4" fmla="*/ 0 h 3077766"/>
             </a:gdLst>
             <a:ahLst/>
             <a:cxnLst>
@@ -4658,7 +4658,7 @@
             </a:cxnLst>
             <a:rect l="l" t="t" r="r" b="b"/>
             <a:pathLst>
-              <a:path w="2916376" h="2523768" extrusionOk="0">
+              <a:path w="2916376" h="3077766" extrusionOk="0">
                 <a:moveTo>
                   <a:pt x="0" y="0"/>
                 </a:moveTo>
@@ -4668,18 +4668,18 @@
                   <a:pt x="2916376" y="0"/>
                 </a:cubicBezTo>
                 <a:cubicBezTo>
-                  <a:pt x="2783494" y="1014728"/>
-                  <a:pt x="3001327" y="1984433"/>
-                  <a:pt x="2916376" y="2523768"/>
-                </a:cubicBezTo>
-                <a:cubicBezTo>
-                  <a:pt x="2116229" y="2658368"/>
-                  <a:pt x="1162341" y="2366572"/>
-                  <a:pt x="0" y="2523768"/>
-                </a:cubicBezTo>
-                <a:cubicBezTo>
-                  <a:pt x="-20187" y="2109051"/>
-                  <a:pt x="-152480" y="1059598"/>
+                  <a:pt x="2783494" y="602655"/>
+                  <a:pt x="3001327" y="2754293"/>
+                  <a:pt x="2916376" y="3077766"/>
+                </a:cubicBezTo>
+                <a:cubicBezTo>
+                  <a:pt x="2116229" y="3212366"/>
+                  <a:pt x="1162341" y="2920570"/>
+                  <a:pt x="0" y="3077766"/>
+                </a:cubicBezTo>
+                <a:cubicBezTo>
+                  <a:pt x="-20187" y="2558217"/>
+                  <a:pt x="-152480" y="794634"/>
                   <a:pt x="0" y="0"/>
                 </a:cubicBezTo>
                 <a:close/>
@@ -4782,7 +4782,7 @@
             </a:r>
             <a:r>
               <a:rPr lang="fr-FR" dirty="0" err="1"/>
-              <a:t>MySQLQueries</a:t>
+              <a:t>ORMConnection</a:t>
             </a:r>
             <a:endParaRPr lang="fr-FR" dirty="0"/>
           </a:p>
@@ -4796,6 +4796,18 @@
               <a:t>ConnectToOFF</a:t>
             </a:r>
             <a:endParaRPr lang="fr-FR" dirty="0"/>
+          </a:p>
+          <a:p>
+            <a:r>
+              <a:rPr lang="fr-FR" dirty="0"/>
+              <a:t>Classes diverses </a:t>
+            </a:r>
+          </a:p>
+          <a:p>
+            <a:r>
+              <a:rPr lang="fr-FR" dirty="0"/>
+              <a:t>pour instancier les données</a:t>
+            </a:r>
           </a:p>
         </p:txBody>
       </p:sp>
@@ -4952,7 +4964,7 @@
           <a:p>
             <a:fld id="{0136EE4A-550F-334C-9212-6C4E51CC2283}" type="datetime1">
               <a:rPr lang="fr-FR" smtClean="0"/>
-              <a:t>14/04/2020</a:t>
+              <a:t>16/05/2020</a:t>
             </a:fld>
             <a:endParaRPr lang="fr-FR"/>
           </a:p>
@@ -5504,7 +5516,7 @@
           <a:p>
             <a:fld id="{0136EE4A-550F-334C-9212-6C4E51CC2283}" type="datetime1">
               <a:rPr lang="fr-FR" smtClean="0"/>
-              <a:t>14/04/2020</a:t>
+              <a:t>16/05/2020</a:t>
             </a:fld>
             <a:endParaRPr lang="fr-FR"/>
           </a:p>
@@ -5953,7 +5965,7 @@
         <p:spPr>
           <a:xfrm>
             <a:off x="628650" y="467139"/>
-            <a:ext cx="6175408" cy="369332"/>
+            <a:ext cx="4766433" cy="369332"/>
           </a:xfrm>
           <a:prstGeom prst="rect">
             <a:avLst/>
@@ -5968,17 +5980,17 @@
           <a:p>
             <a:r>
               <a:rPr lang="fr-FR" dirty="0"/>
-              <a:t>Une base de données élémentaire et évidemment fonctionnelle</a:t>
+              <a:t>Une base de données avec des tables de jointure</a:t>
             </a:r>
           </a:p>
         </p:txBody>
       </p:sp>
       <p:pic>
         <p:nvPicPr>
-          <p:cNvPr id="8" name="Image 7">
+          <p:cNvPr id="3" name="Image 2" descr="Une image contenant capture d’écran&#10;&#10;Description générée automatiquement">
             <a:extLst>
               <a:ext uri="{FF2B5EF4-FFF2-40B4-BE49-F238E27FC236}">
-                <a16:creationId xmlns:a16="http://schemas.microsoft.com/office/drawing/2014/main" id="{E06DC7D6-4877-4C47-B535-F92AEE05CB10}"/>
+                <a16:creationId xmlns:a16="http://schemas.microsoft.com/office/drawing/2014/main" id="{D76B586D-D299-1442-A73C-F0F001CE2E99}"/>
               </a:ext>
             </a:extLst>
           </p:cNvPr>
@@ -5987,15 +5999,16 @@
           </p:cNvPicPr>
           <p:nvPr/>
         </p:nvPicPr>
-        <p:blipFill rotWithShape="1">
+        <p:blipFill>
           <a:blip r:embed="rId2"/>
-          <a:srcRect l="-1" t="35566" r="45761" b="20158"/>
-          <a:stretch/>
+          <a:stretch>
+            <a:fillRect/>
+          </a:stretch>
         </p:blipFill>
         <p:spPr>
           <a:xfrm>
-            <a:off x="2174185" y="1242393"/>
-            <a:ext cx="4959626" cy="2865756"/>
+            <a:off x="0" y="1329994"/>
+            <a:ext cx="9144000" cy="4198012"/>
           </a:xfrm>
           <a:prstGeom prst="rect">
             <a:avLst/>

</xml_diff>